<commit_message>
faltava umas coisinhas no power point...
</commit_message>
<xml_diff>
--- a/AppFinalDeProjecto.pptx
+++ b/AppFinalDeProjecto.pptx
@@ -326,6 +326,11 @@
       </a:defRPr>
     </a:lvl9pPr>
   </p:defaultTextStyle>
+  <p:extLst>
+    <p:ext uri="{EFAFB233-063F-42B5-8137-9DF3F51BA10A}">
+      <p15:sldGuideLst xmlns:p15="http://schemas.microsoft.com/office/powerpoint/2012/main"/>
+    </p:ext>
+  </p:extLst>
 </p:presentation>
 </file>
 
@@ -2433,7 +2438,7 @@
           </a:ln>
           <a:extLst>
             <a:ext uri="{C572A759-6A51-4108-AA02-DFA0A04FC94B}">
-              <ma14:wrappingTextBoxFlag xmlns:ma14="http://schemas.microsoft.com/office/mac/drawingml/2011/main" xmlns:a14="http://schemas.microsoft.com/office/drawing/2010/main" xmlns:m="http://schemas.openxmlformats.org/officeDocument/2006/math" xmlns="" val="1"/>
+              <ma14:wrappingTextBoxFlag xmlns="" xmlns:m="http://schemas.openxmlformats.org/officeDocument/2006/math" xmlns:a14="http://schemas.microsoft.com/office/drawing/2010/main" xmlns:ma14="http://schemas.microsoft.com/office/mac/drawingml/2011/main" val="1"/>
             </a:ext>
           </a:extLst>
         </p:spPr>
@@ -2472,7 +2477,7 @@
           </a:ln>
           <a:extLst>
             <a:ext uri="{C572A759-6A51-4108-AA02-DFA0A04FC94B}">
-              <ma14:wrappingTextBoxFlag xmlns:ma14="http://schemas.microsoft.com/office/mac/drawingml/2011/main" xmlns:a14="http://schemas.microsoft.com/office/drawing/2010/main" xmlns:m="http://schemas.openxmlformats.org/officeDocument/2006/math" xmlns="" val="1"/>
+              <ma14:wrappingTextBoxFlag xmlns="" xmlns:m="http://schemas.openxmlformats.org/officeDocument/2006/math" xmlns:a14="http://schemas.microsoft.com/office/drawing/2010/main" xmlns:ma14="http://schemas.microsoft.com/office/mac/drawingml/2011/main" val="1"/>
             </a:ext>
           </a:extLst>
         </p:spPr>
@@ -3516,7 +3521,7 @@
           </a:ln>
           <a:extLst>
             <a:ext uri="{C572A759-6A51-4108-AA02-DFA0A04FC94B}">
-              <ma14:wrappingTextBoxFlag xmlns:ma14="http://schemas.microsoft.com/office/mac/drawingml/2011/main" xmlns:a14="http://schemas.microsoft.com/office/drawing/2010/main" xmlns:m="http://schemas.openxmlformats.org/officeDocument/2006/math" xmlns="" val="1"/>
+              <ma14:wrappingTextBoxFlag xmlns="" xmlns:m="http://schemas.openxmlformats.org/officeDocument/2006/math" xmlns:a14="http://schemas.microsoft.com/office/drawing/2010/main" xmlns:ma14="http://schemas.microsoft.com/office/mac/drawingml/2011/main" val="1"/>
             </a:ext>
           </a:extLst>
         </p:spPr>
@@ -3622,7 +3627,7 @@
           </a:prstGeom>
           <a:extLst>
             <a:ext uri="{C572A759-6A51-4108-AA02-DFA0A04FC94B}">
-              <ma14:wrappingTextBoxFlag xmlns:ma14="http://schemas.microsoft.com/office/mac/drawingml/2011/main" xmlns:a14="http://schemas.microsoft.com/office/drawing/2010/main" xmlns:m="http://schemas.openxmlformats.org/officeDocument/2006/math" xmlns="" val="1"/>
+              <ma14:wrappingTextBoxFlag xmlns="" xmlns:m="http://schemas.openxmlformats.org/officeDocument/2006/math" xmlns:a14="http://schemas.microsoft.com/office/drawing/2010/main" xmlns:ma14="http://schemas.microsoft.com/office/mac/drawingml/2011/main" val="1"/>
             </a:ext>
           </a:extLst>
         </p:spPr>
@@ -3665,7 +3670,7 @@
           </a:ln>
           <a:extLst>
             <a:ext uri="{C572A759-6A51-4108-AA02-DFA0A04FC94B}">
-              <ma14:wrappingTextBoxFlag xmlns:ma14="http://schemas.microsoft.com/office/mac/drawingml/2011/main" xmlns:a14="http://schemas.microsoft.com/office/drawing/2010/main" xmlns:m="http://schemas.openxmlformats.org/officeDocument/2006/math" xmlns="" val="1"/>
+              <ma14:wrappingTextBoxFlag xmlns="" xmlns:m="http://schemas.openxmlformats.org/officeDocument/2006/math" xmlns:a14="http://schemas.microsoft.com/office/drawing/2010/main" xmlns:ma14="http://schemas.microsoft.com/office/mac/drawingml/2011/main" val="1"/>
             </a:ext>
           </a:extLst>
         </p:spPr>
@@ -3813,7 +3818,7 @@
           </a:ln>
           <a:extLst>
             <a:ext uri="{C572A759-6A51-4108-AA02-DFA0A04FC94B}">
-              <ma14:wrappingTextBoxFlag xmlns:ma14="http://schemas.microsoft.com/office/mac/drawingml/2011/main" xmlns:a14="http://schemas.microsoft.com/office/drawing/2010/main" xmlns:m="http://schemas.openxmlformats.org/officeDocument/2006/math" xmlns="" val="1"/>
+              <ma14:wrappingTextBoxFlag xmlns="" xmlns:m="http://schemas.openxmlformats.org/officeDocument/2006/math" xmlns:a14="http://schemas.microsoft.com/office/drawing/2010/main" xmlns:ma14="http://schemas.microsoft.com/office/mac/drawingml/2011/main" val="1"/>
             </a:ext>
           </a:extLst>
         </p:spPr>
@@ -4088,7 +4093,7 @@
           </a:ln>
           <a:extLst>
             <a:ext uri="{C572A759-6A51-4108-AA02-DFA0A04FC94B}">
-              <ma14:wrappingTextBoxFlag xmlns:ma14="http://schemas.microsoft.com/office/mac/drawingml/2011/main" xmlns:a14="http://schemas.microsoft.com/office/drawing/2010/main" xmlns:m="http://schemas.openxmlformats.org/officeDocument/2006/math" xmlns="" val="1"/>
+              <ma14:wrappingTextBoxFlag xmlns="" xmlns:m="http://schemas.openxmlformats.org/officeDocument/2006/math" xmlns:a14="http://schemas.microsoft.com/office/drawing/2010/main" xmlns:ma14="http://schemas.microsoft.com/office/mac/drawingml/2011/main" val="1"/>
             </a:ext>
           </a:extLst>
         </p:spPr>
@@ -4311,7 +4316,7 @@
           </a:ln>
           <a:extLst>
             <a:ext uri="{C572A759-6A51-4108-AA02-DFA0A04FC94B}">
-              <ma14:wrappingTextBoxFlag xmlns:ma14="http://schemas.microsoft.com/office/mac/drawingml/2011/main" xmlns:a14="http://schemas.microsoft.com/office/drawing/2010/main" xmlns:m="http://schemas.openxmlformats.org/officeDocument/2006/math" xmlns="" val="1"/>
+              <ma14:wrappingTextBoxFlag xmlns="" xmlns:m="http://schemas.openxmlformats.org/officeDocument/2006/math" xmlns:a14="http://schemas.microsoft.com/office/drawing/2010/main" xmlns:ma14="http://schemas.microsoft.com/office/mac/drawingml/2011/main" val="1"/>
             </a:ext>
           </a:extLst>
         </p:spPr>
@@ -4396,7 +4401,7 @@
           </a:ln>
           <a:extLst>
             <a:ext uri="{C572A759-6A51-4108-AA02-DFA0A04FC94B}">
-              <ma14:wrappingTextBoxFlag xmlns:ma14="http://schemas.microsoft.com/office/mac/drawingml/2011/main" xmlns:a14="http://schemas.microsoft.com/office/drawing/2010/main" xmlns:m="http://schemas.openxmlformats.org/officeDocument/2006/math" xmlns="" val="1"/>
+              <ma14:wrappingTextBoxFlag xmlns="" xmlns:m="http://schemas.openxmlformats.org/officeDocument/2006/math" xmlns:a14="http://schemas.microsoft.com/office/drawing/2010/main" xmlns:ma14="http://schemas.microsoft.com/office/mac/drawingml/2011/main" val="1"/>
             </a:ext>
           </a:extLst>
         </p:spPr>
@@ -4556,7 +4561,7 @@
           </a:ln>
           <a:extLst>
             <a:ext uri="{C572A759-6A51-4108-AA02-DFA0A04FC94B}">
-              <ma14:wrappingTextBoxFlag xmlns:ma14="http://schemas.microsoft.com/office/mac/drawingml/2011/main" xmlns:a14="http://schemas.microsoft.com/office/drawing/2010/main" xmlns:m="http://schemas.openxmlformats.org/officeDocument/2006/math" xmlns="" val="1"/>
+              <ma14:wrappingTextBoxFlag xmlns="" xmlns:m="http://schemas.openxmlformats.org/officeDocument/2006/math" xmlns:a14="http://schemas.microsoft.com/office/drawing/2010/main" xmlns:ma14="http://schemas.microsoft.com/office/mac/drawingml/2011/main" val="1"/>
             </a:ext>
           </a:extLst>
         </p:spPr>
@@ -4723,7 +4728,7 @@
           </a:ln>
           <a:extLst>
             <a:ext uri="{C572A759-6A51-4108-AA02-DFA0A04FC94B}">
-              <ma14:wrappingTextBoxFlag xmlns:ma14="http://schemas.microsoft.com/office/mac/drawingml/2011/main" xmlns:a14="http://schemas.microsoft.com/office/drawing/2010/main" xmlns:m="http://schemas.openxmlformats.org/officeDocument/2006/math" xmlns="" val="1"/>
+              <ma14:wrappingTextBoxFlag xmlns="" xmlns:m="http://schemas.openxmlformats.org/officeDocument/2006/math" xmlns:a14="http://schemas.microsoft.com/office/drawing/2010/main" xmlns:ma14="http://schemas.microsoft.com/office/mac/drawingml/2011/main" val="1"/>
             </a:ext>
           </a:extLst>
         </p:spPr>
@@ -4915,7 +4920,7 @@
             <a:pPr lvl="1" algn="just"/>
             <a:r>
               <a:rPr lang="pt-PT" dirty="0"/>
-              <a:t>Implementação de raiz da Componente Cliente (Aplicação Web </a:t>
+              <a:t>Implementação de raiz a Componente Cliente (Aplicação Web </a:t>
             </a:r>
             <a:r>
               <a:rPr lang="pt-PT" i="1" dirty="0"/>
@@ -4959,7 +4964,7 @@
           </a:ln>
           <a:extLst>
             <a:ext uri="{C572A759-6A51-4108-AA02-DFA0A04FC94B}">
-              <ma14:wrappingTextBoxFlag xmlns:ma14="http://schemas.microsoft.com/office/mac/drawingml/2011/main" xmlns:a14="http://schemas.microsoft.com/office/drawing/2010/main" xmlns:m="http://schemas.openxmlformats.org/officeDocument/2006/math" xmlns="" val="1"/>
+              <ma14:wrappingTextBoxFlag xmlns="" xmlns:m="http://schemas.openxmlformats.org/officeDocument/2006/math" xmlns:a14="http://schemas.microsoft.com/office/drawing/2010/main" xmlns:ma14="http://schemas.microsoft.com/office/mac/drawingml/2011/main" val="1"/>
             </a:ext>
           </a:extLst>
         </p:spPr>
@@ -5153,7 +5158,7 @@
           </a:ln>
           <a:extLst>
             <a:ext uri="{C572A759-6A51-4108-AA02-DFA0A04FC94B}">
-              <ma14:wrappingTextBoxFlag xmlns:ma14="http://schemas.microsoft.com/office/mac/drawingml/2011/main" xmlns:a14="http://schemas.microsoft.com/office/drawing/2010/main" xmlns:m="http://schemas.openxmlformats.org/officeDocument/2006/math" xmlns="" val="1"/>
+              <ma14:wrappingTextBoxFlag xmlns="" xmlns:m="http://schemas.openxmlformats.org/officeDocument/2006/math" xmlns:a14="http://schemas.microsoft.com/office/drawing/2010/main" xmlns:ma14="http://schemas.microsoft.com/office/mac/drawingml/2011/main" val="1"/>
             </a:ext>
           </a:extLst>
         </p:spPr>
@@ -5280,22 +5285,124 @@
           <a:lstStyle/>
           <a:p>
             <a:r>
-              <a:t>Melhoria da interface gráfica na aplicação cliente</a:t>
-            </a:r>
-          </a:p>
-          <a:p>
-            <a:r>
-              <a:t>Melhoria do tratamento de erros na aplicação cliente</a:t>
-            </a:r>
-          </a:p>
-          <a:p>
-            <a:r>
-              <a:rPr i="1"/>
+              <a:rPr dirty="0" err="1"/>
+              <a:t>Melhoria</a:t>
+            </a:r>
+            <a:r>
+              <a:rPr dirty="0"/>
+              <a:t> da interface </a:t>
+            </a:r>
+            <a:r>
+              <a:rPr dirty="0" err="1"/>
+              <a:t>gráfica</a:t>
+            </a:r>
+            <a:r>
+              <a:rPr dirty="0"/>
+              <a:t> </a:t>
+            </a:r>
+            <a:r>
+              <a:rPr dirty="0" err="1"/>
+              <a:t>na</a:t>
+            </a:r>
+            <a:r>
+              <a:rPr dirty="0"/>
+              <a:t> </a:t>
+            </a:r>
+            <a:r>
+              <a:rPr dirty="0" err="1"/>
+              <a:t>aplicação</a:t>
+            </a:r>
+            <a:r>
+              <a:rPr dirty="0"/>
+              <a:t> </a:t>
+            </a:r>
+            <a:r>
+              <a:rPr dirty="0" err="1"/>
+              <a:t>cliente</a:t>
+            </a:r>
+            <a:endParaRPr dirty="0"/>
+          </a:p>
+          <a:p>
+            <a:r>
+              <a:rPr dirty="0" err="1"/>
+              <a:t>Melhoria</a:t>
+            </a:r>
+            <a:r>
+              <a:rPr dirty="0"/>
+              <a:t> do </a:t>
+            </a:r>
+            <a:r>
+              <a:rPr dirty="0" err="1"/>
+              <a:t>tratamento</a:t>
+            </a:r>
+            <a:r>
+              <a:rPr dirty="0"/>
+              <a:t> de </a:t>
+            </a:r>
+            <a:r>
+              <a:rPr dirty="0" err="1"/>
+              <a:t>erros</a:t>
+            </a:r>
+            <a:r>
+              <a:rPr dirty="0"/>
+              <a:t> </a:t>
+            </a:r>
+            <a:r>
+              <a:rPr dirty="0" err="1"/>
+              <a:t>na</a:t>
+            </a:r>
+            <a:r>
+              <a:rPr dirty="0"/>
+              <a:t> </a:t>
+            </a:r>
+            <a:r>
+              <a:rPr dirty="0" err="1"/>
+              <a:t>aplicação</a:t>
+            </a:r>
+            <a:r>
+              <a:rPr dirty="0"/>
+              <a:t> </a:t>
+            </a:r>
+            <a:r>
+              <a:rPr dirty="0" err="1"/>
+              <a:t>cliente</a:t>
+            </a:r>
+            <a:endParaRPr dirty="0"/>
+          </a:p>
+          <a:p>
+            <a:r>
+              <a:rPr i="1" dirty="0"/>
               <a:t>Deployment</a:t>
             </a:r>
             <a:r>
-              <a:t> das aplicações cliente e servidor</a:t>
-            </a:r>
+              <a:rPr dirty="0"/>
+              <a:t> das </a:t>
+            </a:r>
+            <a:r>
+              <a:rPr dirty="0" err="1"/>
+              <a:t>aplicações</a:t>
+            </a:r>
+            <a:r>
+              <a:rPr dirty="0"/>
+              <a:t> </a:t>
+            </a:r>
+            <a:r>
+              <a:rPr dirty="0" err="1"/>
+              <a:t>cliente</a:t>
+            </a:r>
+            <a:r>
+              <a:rPr dirty="0"/>
+              <a:t> e </a:t>
+            </a:r>
+            <a:r>
+              <a:rPr dirty="0" err="1"/>
+              <a:t>servidor</a:t>
+            </a:r>
+            <a:r>
+              <a:rPr lang="pt-PT" dirty="0"/>
+              <a:t>as</a:t>
+            </a:r>
+            <a:endParaRPr dirty="0"/>
           </a:p>
         </p:txBody>
       </p:sp>
@@ -5318,7 +5425,7 @@
           </a:ln>
           <a:extLst>
             <a:ext uri="{C572A759-6A51-4108-AA02-DFA0A04FC94B}">
-              <ma14:wrappingTextBoxFlag xmlns:ma14="http://schemas.microsoft.com/office/mac/drawingml/2011/main" xmlns:a14="http://schemas.microsoft.com/office/drawing/2010/main" xmlns:m="http://schemas.openxmlformats.org/officeDocument/2006/math" xmlns="" val="1"/>
+              <ma14:wrappingTextBoxFlag xmlns="" xmlns:m="http://schemas.openxmlformats.org/officeDocument/2006/math" xmlns:a14="http://schemas.microsoft.com/office/drawing/2010/main" xmlns:ma14="http://schemas.microsoft.com/office/mac/drawingml/2011/main" val="1"/>
             </a:ext>
           </a:extLst>
         </p:spPr>
@@ -5480,7 +5587,7 @@
           </a:ln>
           <a:extLst>
             <a:ext uri="{C572A759-6A51-4108-AA02-DFA0A04FC94B}">
-              <ma14:wrappingTextBoxFlag xmlns:ma14="http://schemas.microsoft.com/office/mac/drawingml/2011/main" xmlns:a14="http://schemas.microsoft.com/office/drawing/2010/main" xmlns:m="http://schemas.openxmlformats.org/officeDocument/2006/math" xmlns="" val="1"/>
+              <ma14:wrappingTextBoxFlag xmlns="" xmlns:m="http://schemas.openxmlformats.org/officeDocument/2006/math" xmlns:a14="http://schemas.microsoft.com/office/drawing/2010/main" xmlns:ma14="http://schemas.microsoft.com/office/mac/drawingml/2011/main" val="1"/>
             </a:ext>
           </a:extLst>
         </p:spPr>
@@ -5898,7 +6005,7 @@
           </a:ln>
           <a:extLst>
             <a:ext uri="{C572A759-6A51-4108-AA02-DFA0A04FC94B}">
-              <ma14:wrappingTextBoxFlag xmlns:ma14="http://schemas.microsoft.com/office/mac/drawingml/2011/main" xmlns:a14="http://schemas.microsoft.com/office/drawing/2010/main" xmlns:m="http://schemas.openxmlformats.org/officeDocument/2006/math" xmlns="" val="1"/>
+              <ma14:wrappingTextBoxFlag xmlns="" xmlns:m="http://schemas.openxmlformats.org/officeDocument/2006/math" xmlns:a14="http://schemas.microsoft.com/office/drawing/2010/main" xmlns:ma14="http://schemas.microsoft.com/office/mac/drawingml/2011/main" val="1"/>
             </a:ext>
           </a:extLst>
         </p:spPr>
@@ -6050,7 +6157,7 @@
           </a:ln>
           <a:extLst>
             <a:ext uri="{C572A759-6A51-4108-AA02-DFA0A04FC94B}">
-              <ma14:wrappingTextBoxFlag xmlns:ma14="http://schemas.microsoft.com/office/mac/drawingml/2011/main" xmlns:a14="http://schemas.microsoft.com/office/drawing/2010/main" xmlns:m="http://schemas.openxmlformats.org/officeDocument/2006/math" xmlns="" val="1"/>
+              <ma14:wrappingTextBoxFlag xmlns="" xmlns:m="http://schemas.openxmlformats.org/officeDocument/2006/math" xmlns:a14="http://schemas.microsoft.com/office/drawing/2010/main" xmlns:ma14="http://schemas.microsoft.com/office/mac/drawingml/2011/main" val="1"/>
             </a:ext>
           </a:extLst>
         </p:spPr>
@@ -6200,20 +6307,161 @@
           <a:p>
             <a:pPr algn="just"/>
             <a:r>
-              <a:t>Desenvolvimento de um sistema de informação que permita realizar a administração de sondas e análise de dados provenientes das mesmas </a:t>
+              <a:rPr dirty="0" err="1"/>
+              <a:t>Desenvolv</a:t>
+            </a:r>
+            <a:r>
+              <a:rPr lang="pt-PT" dirty="0" err="1"/>
+              <a:t>er</a:t>
+            </a:r>
+            <a:r>
+              <a:rPr dirty="0"/>
+              <a:t> um </a:t>
+            </a:r>
+            <a:r>
+              <a:rPr dirty="0" err="1"/>
+              <a:t>sistema</a:t>
+            </a:r>
+            <a:r>
+              <a:rPr dirty="0"/>
+              <a:t> de </a:t>
+            </a:r>
+            <a:r>
+              <a:rPr dirty="0" err="1"/>
+              <a:t>informação</a:t>
+            </a:r>
+            <a:r>
+              <a:rPr dirty="0"/>
+              <a:t> que </a:t>
+            </a:r>
+            <a:r>
+              <a:rPr dirty="0" err="1"/>
+              <a:t>permita</a:t>
+            </a:r>
+            <a:r>
+              <a:rPr dirty="0"/>
+              <a:t> </a:t>
+            </a:r>
+            <a:r>
+              <a:rPr dirty="0" err="1"/>
+              <a:t>realizar</a:t>
+            </a:r>
+            <a:r>
+              <a:rPr dirty="0"/>
+              <a:t> a </a:t>
+            </a:r>
+            <a:r>
+              <a:rPr dirty="0" err="1"/>
+              <a:t>administração</a:t>
+            </a:r>
+            <a:r>
+              <a:rPr dirty="0"/>
+              <a:t> de </a:t>
+            </a:r>
+            <a:r>
+              <a:rPr dirty="0" err="1"/>
+              <a:t>sondas</a:t>
+            </a:r>
+            <a:r>
+              <a:rPr dirty="0"/>
+              <a:t> e </a:t>
+            </a:r>
+            <a:r>
+              <a:rPr dirty="0" err="1"/>
+              <a:t>análise</a:t>
+            </a:r>
+            <a:r>
+              <a:rPr dirty="0"/>
+              <a:t> de dados </a:t>
+            </a:r>
+            <a:r>
+              <a:rPr dirty="0" err="1"/>
+              <a:t>provenientes</a:t>
+            </a:r>
+            <a:r>
+              <a:rPr dirty="0"/>
+              <a:t> das </a:t>
+            </a:r>
+            <a:r>
+              <a:rPr dirty="0" err="1"/>
+              <a:t>mesmas</a:t>
+            </a:r>
+            <a:r>
+              <a:rPr dirty="0"/>
+              <a:t> </a:t>
             </a:r>
           </a:p>
           <a:p>
             <a:pPr algn="just"/>
             <a:r>
-              <a:t>Observação fácil e objectiva dos dados e administração do sistema</a:t>
-            </a:r>
+              <a:rPr dirty="0" err="1"/>
+              <a:t>Observação</a:t>
+            </a:r>
+            <a:r>
+              <a:rPr dirty="0"/>
+              <a:t> </a:t>
+            </a:r>
+            <a:r>
+              <a:rPr dirty="0" err="1"/>
+              <a:t>fácil</a:t>
+            </a:r>
+            <a:r>
+              <a:rPr dirty="0"/>
+              <a:t> e </a:t>
+            </a:r>
+            <a:r>
+              <a:rPr dirty="0" err="1"/>
+              <a:t>objectiva</a:t>
+            </a:r>
+            <a:r>
+              <a:rPr dirty="0"/>
+              <a:t> dos dados e </a:t>
+            </a:r>
+            <a:r>
+              <a:rPr dirty="0" err="1"/>
+              <a:t>administração</a:t>
+            </a:r>
+            <a:r>
+              <a:rPr dirty="0"/>
+              <a:t> do </a:t>
+            </a:r>
+            <a:r>
+              <a:rPr dirty="0" err="1"/>
+              <a:t>sistema</a:t>
+            </a:r>
+            <a:endParaRPr dirty="0"/>
           </a:p>
           <a:p>
             <a:pPr algn="just"/>
             <a:r>
-              <a:t>Assegurar a gestão do equipamento e de configurações</a:t>
-            </a:r>
+              <a:rPr dirty="0" err="1"/>
+              <a:t>Assegurar</a:t>
+            </a:r>
+            <a:r>
+              <a:rPr dirty="0"/>
+              <a:t> a </a:t>
+            </a:r>
+            <a:r>
+              <a:rPr dirty="0" err="1"/>
+              <a:t>gestão</a:t>
+            </a:r>
+            <a:r>
+              <a:rPr dirty="0"/>
+              <a:t> do </a:t>
+            </a:r>
+            <a:r>
+              <a:rPr dirty="0" err="1"/>
+              <a:t>equipamento</a:t>
+            </a:r>
+            <a:r>
+              <a:rPr dirty="0"/>
+              <a:t> e de </a:t>
+            </a:r>
+            <a:r>
+              <a:rPr dirty="0" err="1"/>
+              <a:t>configurações</a:t>
+            </a:r>
+            <a:endParaRPr dirty="0"/>
           </a:p>
         </p:txBody>
       </p:sp>
@@ -6236,7 +6484,7 @@
           </a:ln>
           <a:extLst>
             <a:ext uri="{C572A759-6A51-4108-AA02-DFA0A04FC94B}">
-              <ma14:wrappingTextBoxFlag xmlns:ma14="http://schemas.microsoft.com/office/mac/drawingml/2011/main" xmlns:a14="http://schemas.microsoft.com/office/drawing/2010/main" xmlns:m="http://schemas.openxmlformats.org/officeDocument/2006/math" xmlns="" val="1"/>
+              <ma14:wrappingTextBoxFlag xmlns="" xmlns:m="http://schemas.openxmlformats.org/officeDocument/2006/math" xmlns:a14="http://schemas.microsoft.com/office/drawing/2010/main" xmlns:ma14="http://schemas.microsoft.com/office/mac/drawingml/2011/main" val="1"/>
             </a:ext>
           </a:extLst>
         </p:spPr>
@@ -6329,7 +6577,12 @@
           </a:lstStyle>
           <a:p>
             <a:r>
-              <a:t>Diagrama da Arquitectura do Sistema</a:t>
+              <a:rPr dirty="0" err="1"/>
+              <a:t>Arquitectura</a:t>
+            </a:r>
+            <a:r>
+              <a:rPr dirty="0"/>
+              <a:t> do Sistema</a:t>
             </a:r>
           </a:p>
         </p:txBody>
@@ -6353,7 +6606,7 @@
           </a:ln>
           <a:extLst>
             <a:ext uri="{C572A759-6A51-4108-AA02-DFA0A04FC94B}">
-              <ma14:wrappingTextBoxFlag xmlns:ma14="http://schemas.microsoft.com/office/mac/drawingml/2011/main" xmlns:a14="http://schemas.microsoft.com/office/drawing/2010/main" xmlns:m="http://schemas.openxmlformats.org/officeDocument/2006/math" xmlns="" val="1"/>
+              <ma14:wrappingTextBoxFlag xmlns="" xmlns:m="http://schemas.openxmlformats.org/officeDocument/2006/math" xmlns:a14="http://schemas.microsoft.com/office/drawing/2010/main" xmlns:ma14="http://schemas.microsoft.com/office/mac/drawingml/2011/main" val="1"/>
             </a:ext>
           </a:extLst>
         </p:spPr>
@@ -6520,7 +6773,7 @@
           </a:ln>
           <a:extLst>
             <a:ext uri="{C572A759-6A51-4108-AA02-DFA0A04FC94B}">
-              <ma14:wrappingTextBoxFlag xmlns:ma14="http://schemas.microsoft.com/office/mac/drawingml/2011/main" xmlns:a14="http://schemas.microsoft.com/office/drawing/2010/main" xmlns:m="http://schemas.openxmlformats.org/officeDocument/2006/math" xmlns="" val="1"/>
+              <ma14:wrappingTextBoxFlag xmlns="" xmlns:m="http://schemas.openxmlformats.org/officeDocument/2006/math" xmlns:a14="http://schemas.microsoft.com/office/drawing/2010/main" xmlns:ma14="http://schemas.microsoft.com/office/mac/drawingml/2011/main" val="1"/>
             </a:ext>
           </a:extLst>
         </p:spPr>
@@ -6745,7 +6998,7 @@
           </a:ln>
           <a:extLst>
             <a:ext uri="{C572A759-6A51-4108-AA02-DFA0A04FC94B}">
-              <ma14:wrappingTextBoxFlag xmlns:ma14="http://schemas.microsoft.com/office/mac/drawingml/2011/main" xmlns:a14="http://schemas.microsoft.com/office/drawing/2010/main" xmlns:m="http://schemas.openxmlformats.org/officeDocument/2006/math" xmlns="" val="1"/>
+              <ma14:wrappingTextBoxFlag xmlns="" xmlns:m="http://schemas.openxmlformats.org/officeDocument/2006/math" xmlns:a14="http://schemas.microsoft.com/office/drawing/2010/main" xmlns:ma14="http://schemas.microsoft.com/office/mac/drawingml/2011/main" val="1"/>
             </a:ext>
           </a:extLst>
         </p:spPr>
@@ -6912,7 +7165,7 @@
           </a:ln>
           <a:extLst>
             <a:ext uri="{C572A759-6A51-4108-AA02-DFA0A04FC94B}">
-              <ma14:wrappingTextBoxFlag xmlns:ma14="http://schemas.microsoft.com/office/mac/drawingml/2011/main" xmlns:a14="http://schemas.microsoft.com/office/drawing/2010/main" xmlns:m="http://schemas.openxmlformats.org/officeDocument/2006/math" xmlns="" val="1"/>
+              <ma14:wrappingTextBoxFlag xmlns="" xmlns:m="http://schemas.openxmlformats.org/officeDocument/2006/math" xmlns:a14="http://schemas.microsoft.com/office/drawing/2010/main" xmlns:ma14="http://schemas.microsoft.com/office/mac/drawingml/2011/main" val="1"/>
             </a:ext>
           </a:extLst>
         </p:spPr>

</xml_diff>